<commit_message>
Fix powerpoint to pass schema check
</commit_message>
<xml_diff>
--- a/test/ShapeCrawler.Tests.Unit/Assets/061_font-color.pptx
+++ b/test/ShapeCrawler.Tests.Unit/Assets/061_font-color.pptx
@@ -753,9 +753,6 @@
             </a:pPr>
             <a:r>
               <a:rPr kumimoji="0" lang="en-US" sz="2000" b="1" i="0" u="none" strike="noStrike" kern="1200" cap="none" spc="0" normalizeH="0" baseline="0" noProof="0" dirty="0">
-                <a:ln>
-                  <a:noFill/>
-                </a:ln>
                 <a:solidFill>
                   <a:schemeClr val="tx1"/>
                 </a:solidFill>
@@ -826,9 +823,6 @@
             </a:pPr>
             <a:r>
               <a:rPr kumimoji="0" lang="en-US" sz="2000" b="1" i="0" u="none" strike="noStrike" kern="1200" cap="none" spc="0" normalizeH="0" baseline="0" noProof="0" dirty="0">
-                <a:ln>
-                  <a:noFill/>
-                </a:ln>
                 <a:solidFill>
                   <a:schemeClr val="tx1"/>
                 </a:solidFill>

</xml_diff>